<commit_message>
add updated pptx slide
</commit_message>
<xml_diff>
--- a/slides/disease-venn.pptx
+++ b/slides/disease-venn.pptx
@@ -104,6 +104,11 @@
       </a:defRPr>
     </a:lvl9pPr>
   </p:defaultTextStyle>
+  <p:extLst>
+    <p:ext uri="{EFAFB233-063F-42B5-8137-9DF3F51BA10A}">
+      <p15:sldGuideLst xmlns:p15="http://schemas.microsoft.com/office/powerpoint/2012/main"/>
+    </p:ext>
+  </p:extLst>
 </p:presentation>
 </file>
 
@@ -254,7 +259,7 @@
           <a:p>
             <a:fld id="{8E757AA1-D83A-4808-A7DF-B493ED53B93D}" type="datetimeFigureOut">
               <a:rPr lang="en-US" smtClean="0"/>
-              <a:t>9/7/2019</a:t>
+              <a:t>9/11/2019</a:t>
             </a:fld>
             <a:endParaRPr lang="en-US"/>
           </a:p>
@@ -452,7 +457,7 @@
           <a:p>
             <a:fld id="{8E757AA1-D83A-4808-A7DF-B493ED53B93D}" type="datetimeFigureOut">
               <a:rPr lang="en-US" smtClean="0"/>
-              <a:t>9/7/2019</a:t>
+              <a:t>9/11/2019</a:t>
             </a:fld>
             <a:endParaRPr lang="en-US"/>
           </a:p>
@@ -660,7 +665,7 @@
           <a:p>
             <a:fld id="{8E757AA1-D83A-4808-A7DF-B493ED53B93D}" type="datetimeFigureOut">
               <a:rPr lang="en-US" smtClean="0"/>
-              <a:t>9/7/2019</a:t>
+              <a:t>9/11/2019</a:t>
             </a:fld>
             <a:endParaRPr lang="en-US"/>
           </a:p>
@@ -858,7 +863,7 @@
           <a:p>
             <a:fld id="{8E757AA1-D83A-4808-A7DF-B493ED53B93D}" type="datetimeFigureOut">
               <a:rPr lang="en-US" smtClean="0"/>
-              <a:t>9/7/2019</a:t>
+              <a:t>9/11/2019</a:t>
             </a:fld>
             <a:endParaRPr lang="en-US"/>
           </a:p>
@@ -1133,7 +1138,7 @@
           <a:p>
             <a:fld id="{8E757AA1-D83A-4808-A7DF-B493ED53B93D}" type="datetimeFigureOut">
               <a:rPr lang="en-US" smtClean="0"/>
-              <a:t>9/7/2019</a:t>
+              <a:t>9/11/2019</a:t>
             </a:fld>
             <a:endParaRPr lang="en-US"/>
           </a:p>
@@ -1398,7 +1403,7 @@
           <a:p>
             <a:fld id="{8E757AA1-D83A-4808-A7DF-B493ED53B93D}" type="datetimeFigureOut">
               <a:rPr lang="en-US" smtClean="0"/>
-              <a:t>9/7/2019</a:t>
+              <a:t>9/11/2019</a:t>
             </a:fld>
             <a:endParaRPr lang="en-US"/>
           </a:p>
@@ -1810,7 +1815,7 @@
           <a:p>
             <a:fld id="{8E757AA1-D83A-4808-A7DF-B493ED53B93D}" type="datetimeFigureOut">
               <a:rPr lang="en-US" smtClean="0"/>
-              <a:t>9/7/2019</a:t>
+              <a:t>9/11/2019</a:t>
             </a:fld>
             <a:endParaRPr lang="en-US"/>
           </a:p>
@@ -1951,7 +1956,7 @@
           <a:p>
             <a:fld id="{8E757AA1-D83A-4808-A7DF-B493ED53B93D}" type="datetimeFigureOut">
               <a:rPr lang="en-US" smtClean="0"/>
-              <a:t>9/7/2019</a:t>
+              <a:t>9/11/2019</a:t>
             </a:fld>
             <a:endParaRPr lang="en-US"/>
           </a:p>
@@ -2064,7 +2069,7 @@
           <a:p>
             <a:fld id="{8E757AA1-D83A-4808-A7DF-B493ED53B93D}" type="datetimeFigureOut">
               <a:rPr lang="en-US" smtClean="0"/>
-              <a:t>9/7/2019</a:t>
+              <a:t>9/11/2019</a:t>
             </a:fld>
             <a:endParaRPr lang="en-US"/>
           </a:p>
@@ -2375,7 +2380,7 @@
           <a:p>
             <a:fld id="{8E757AA1-D83A-4808-A7DF-B493ED53B93D}" type="datetimeFigureOut">
               <a:rPr lang="en-US" smtClean="0"/>
-              <a:t>9/7/2019</a:t>
+              <a:t>9/11/2019</a:t>
             </a:fld>
             <a:endParaRPr lang="en-US"/>
           </a:p>
@@ -2663,7 +2668,7 @@
           <a:p>
             <a:fld id="{8E757AA1-D83A-4808-A7DF-B493ED53B93D}" type="datetimeFigureOut">
               <a:rPr lang="en-US" smtClean="0"/>
-              <a:t>9/7/2019</a:t>
+              <a:t>9/11/2019</a:t>
             </a:fld>
             <a:endParaRPr lang="en-US"/>
           </a:p>
@@ -2904,7 +2909,7 @@
           <a:p>
             <a:fld id="{8E757AA1-D83A-4808-A7DF-B493ED53B93D}" type="datetimeFigureOut">
               <a:rPr lang="en-US" smtClean="0"/>
-              <a:t>9/7/2019</a:t>
+              <a:t>9/11/2019</a:t>
             </a:fld>
             <a:endParaRPr lang="en-US"/>
           </a:p>
@@ -3337,8 +3342,8 @@
         </p:nvCxnSpPr>
         <p:spPr>
           <a:xfrm>
-            <a:off x="5756790" y="4941329"/>
-            <a:ext cx="1566732" cy="0"/>
+            <a:off x="4834108" y="4941329"/>
+            <a:ext cx="2088761" cy="0"/>
           </a:xfrm>
           <a:prstGeom prst="line">
             <a:avLst/>
@@ -3378,8 +3383,8 @@
         </p:nvSpPr>
         <p:spPr>
           <a:xfrm>
-            <a:off x="413146" y="363715"/>
-            <a:ext cx="4363087" cy="4363087"/>
+            <a:off x="417927" y="439677"/>
+            <a:ext cx="4055058" cy="4250426"/>
           </a:xfrm>
           <a:prstGeom prst="ellipse">
             <a:avLst/>
@@ -3431,8 +3436,8 @@
         </p:nvSpPr>
         <p:spPr>
           <a:xfrm>
-            <a:off x="1626220" y="1399932"/>
-            <a:ext cx="4363087" cy="4363087"/>
+            <a:off x="1521738" y="987889"/>
+            <a:ext cx="4366253" cy="4589932"/>
           </a:xfrm>
           <a:prstGeom prst="ellipse">
             <a:avLst/>
@@ -3460,7 +3465,7 @@
           <a:lstStyle/>
           <a:p>
             <a:pPr algn="ctr"/>
-            <a:endParaRPr>
+            <a:endParaRPr dirty="0">
               <a:sym typeface="Calibri"/>
             </a:endParaRPr>
           </a:p>
@@ -3480,8 +3485,8 @@
         </p:nvSpPr>
         <p:spPr>
           <a:xfrm>
-            <a:off x="1531567" y="2051426"/>
-            <a:ext cx="4363087" cy="4363087"/>
+            <a:off x="1394930" y="1708915"/>
+            <a:ext cx="4381293" cy="3578687"/>
           </a:xfrm>
           <a:prstGeom prst="ellipse">
             <a:avLst/>
@@ -3509,13 +3514,7 @@
           <a:lstStyle/>
           <a:p>
             <a:pPr algn="ctr"/>
-            <a:endParaRPr>
-              <a:solidFill>
-                <a:srgbClr val="FFFFFF"/>
-              </a:solidFill>
-              <a:latin typeface="Calibri"/>
-              <a:ea typeface="Calibri"/>
-              <a:cs typeface="Calibri"/>
+            <a:endParaRPr dirty="0">
               <a:sym typeface="Calibri"/>
             </a:endParaRPr>
           </a:p>
@@ -3536,6 +3535,45 @@
         <p:spPr>
           <a:xfrm>
             <a:off x="2715901" y="3029323"/>
+            <a:ext cx="930698" cy="461665"/>
+          </a:xfrm>
+          <a:prstGeom prst="rect">
+            <a:avLst/>
+          </a:prstGeom>
+          <a:noFill/>
+        </p:spPr>
+        <p:txBody>
+          <a:bodyPr wrap="square" rtlCol="0">
+            <a:spAutoFit/>
+          </a:bodyPr>
+          <a:lstStyle/>
+          <a:p>
+            <a:r>
+              <a:rPr lang="en-US" sz="2400" b="1" dirty="0">
+                <a:solidFill>
+                  <a:schemeClr val="bg1"/>
+                </a:solidFill>
+              </a:rPr>
+              <a:t>2323</a:t>
+            </a:r>
+          </a:p>
+        </p:txBody>
+      </p:sp>
+      <p:sp>
+        <p:nvSpPr>
+          <p:cNvPr id="8" name="TextBox 7">
+            <a:extLst>
+              <a:ext uri="{FF2B5EF4-FFF2-40B4-BE49-F238E27FC236}">
+                <a16:creationId xmlns:a16="http://schemas.microsoft.com/office/drawing/2014/main" id="{D1E48601-4586-476A-BB17-7E37A9E5BD29}"/>
+              </a:ext>
+            </a:extLst>
+          </p:cNvPr>
+          <p:cNvSpPr txBox="1"/>
+          <p:nvPr/>
+        </p:nvSpPr>
+        <p:spPr>
+          <a:xfrm>
+            <a:off x="4471392" y="1441396"/>
             <a:ext cx="930698" cy="419695"/>
           </a:xfrm>
           <a:prstGeom prst="rect">
@@ -3555,17 +3593,17 @@
                   <a:schemeClr val="bg1"/>
                 </a:solidFill>
               </a:rPr>
-              <a:t>2342</a:t>
-            </a:r>
-          </a:p>
-        </p:txBody>
-      </p:sp>
-      <p:sp>
-        <p:nvSpPr>
-          <p:cNvPr id="8" name="TextBox 7">
-            <a:extLst>
-              <a:ext uri="{FF2B5EF4-FFF2-40B4-BE49-F238E27FC236}">
-                <a16:creationId xmlns:a16="http://schemas.microsoft.com/office/drawing/2014/main" id="{D1E48601-4586-476A-BB17-7E37A9E5BD29}"/>
+              <a:t>168</a:t>
+            </a:r>
+          </a:p>
+        </p:txBody>
+      </p:sp>
+      <p:sp>
+        <p:nvSpPr>
+          <p:cNvPr id="9" name="TextBox 8">
+            <a:extLst>
+              <a:ext uri="{FF2B5EF4-FFF2-40B4-BE49-F238E27FC236}">
+                <a16:creationId xmlns:a16="http://schemas.microsoft.com/office/drawing/2014/main" id="{4DA55FD7-8FD0-4943-8694-F2E65B88E3F1}"/>
               </a:ext>
             </a:extLst>
           </p:cNvPr>
@@ -3574,46 +3612,7 @@
         </p:nvSpPr>
         <p:spPr>
           <a:xfrm>
-            <a:off x="4721222" y="1845968"/>
-            <a:ext cx="930698" cy="419695"/>
-          </a:xfrm>
-          <a:prstGeom prst="rect">
-            <a:avLst/>
-          </a:prstGeom>
-          <a:noFill/>
-        </p:spPr>
-        <p:txBody>
-          <a:bodyPr wrap="square" rtlCol="0">
-            <a:spAutoFit/>
-          </a:bodyPr>
-          <a:lstStyle/>
-          <a:p>
-            <a:r>
-              <a:rPr lang="en-US" sz="2400" b="1" dirty="0">
-                <a:solidFill>
-                  <a:schemeClr val="bg1"/>
-                </a:solidFill>
-              </a:rPr>
-              <a:t>168</a:t>
-            </a:r>
-          </a:p>
-        </p:txBody>
-      </p:sp>
-      <p:sp>
-        <p:nvSpPr>
-          <p:cNvPr id="9" name="TextBox 8">
-            <a:extLst>
-              <a:ext uri="{FF2B5EF4-FFF2-40B4-BE49-F238E27FC236}">
-                <a16:creationId xmlns:a16="http://schemas.microsoft.com/office/drawing/2014/main" id="{4DA55FD7-8FD0-4943-8694-F2E65B88E3F1}"/>
-              </a:ext>
-            </a:extLst>
-          </p:cNvPr>
-          <p:cNvSpPr txBox="1"/>
-          <p:nvPr/>
-        </p:nvSpPr>
-        <p:spPr>
-          <a:xfrm>
-            <a:off x="3260066" y="1531441"/>
+            <a:off x="2844698" y="1247250"/>
             <a:ext cx="773067" cy="461665"/>
           </a:xfrm>
           <a:prstGeom prst="rect">
@@ -3653,7 +3652,7 @@
         <p:spPr>
           <a:xfrm>
             <a:off x="4392709" y="4254831"/>
-            <a:ext cx="930698" cy="419695"/>
+            <a:ext cx="930698" cy="461665"/>
           </a:xfrm>
           <a:prstGeom prst="rect">
             <a:avLst/>
@@ -3672,17 +3671,17 @@
                   <a:schemeClr val="bg1"/>
                 </a:solidFill>
               </a:rPr>
-              <a:t>2918</a:t>
-            </a:r>
-          </a:p>
-        </p:txBody>
-      </p:sp>
-      <p:sp>
-        <p:nvSpPr>
-          <p:cNvPr id="11" name="TextBox 10">
-            <a:extLst>
-              <a:ext uri="{FF2B5EF4-FFF2-40B4-BE49-F238E27FC236}">
-                <a16:creationId xmlns:a16="http://schemas.microsoft.com/office/drawing/2014/main" id="{D9416CAA-1247-4A85-8D11-8FC8143AE92C}"/>
+              <a:t>2372</a:t>
+            </a:r>
+          </a:p>
+        </p:txBody>
+      </p:sp>
+      <p:sp>
+        <p:nvSpPr>
+          <p:cNvPr id="12" name="TextBox 11">
+            <a:extLst>
+              <a:ext uri="{FF2B5EF4-FFF2-40B4-BE49-F238E27FC236}">
+                <a16:creationId xmlns:a16="http://schemas.microsoft.com/office/drawing/2014/main" id="{262EC693-5023-455B-B8A8-95C4FDD6381C}"/>
               </a:ext>
             </a:extLst>
           </p:cNvPr>
@@ -3691,46 +3690,7 @@
         </p:nvSpPr>
         <p:spPr>
           <a:xfrm>
-            <a:off x="3322511" y="5820194"/>
-            <a:ext cx="648178" cy="419695"/>
-          </a:xfrm>
-          <a:prstGeom prst="rect">
-            <a:avLst/>
-          </a:prstGeom>
-          <a:noFill/>
-        </p:spPr>
-        <p:txBody>
-          <a:bodyPr wrap="square" rtlCol="0">
-            <a:spAutoFit/>
-          </a:bodyPr>
-          <a:lstStyle/>
-          <a:p>
-            <a:r>
-              <a:rPr lang="en-US" sz="2400" b="1" dirty="0">
-                <a:solidFill>
-                  <a:schemeClr val="bg1"/>
-                </a:solidFill>
-              </a:rPr>
-              <a:t>454</a:t>
-            </a:r>
-          </a:p>
-        </p:txBody>
-      </p:sp>
-      <p:sp>
-        <p:nvSpPr>
-          <p:cNvPr id="12" name="TextBox 11">
-            <a:extLst>
-              <a:ext uri="{FF2B5EF4-FFF2-40B4-BE49-F238E27FC236}">
-                <a16:creationId xmlns:a16="http://schemas.microsoft.com/office/drawing/2014/main" id="{262EC693-5023-455B-B8A8-95C4FDD6381C}"/>
-              </a:ext>
-            </a:extLst>
-          </p:cNvPr>
-          <p:cNvSpPr txBox="1"/>
-          <p:nvPr/>
-        </p:nvSpPr>
-        <p:spPr>
-          <a:xfrm>
-            <a:off x="1394930" y="1261270"/>
+            <a:off x="1020797" y="1441396"/>
             <a:ext cx="894796" cy="461665"/>
           </a:xfrm>
           <a:prstGeom prst="rect">
@@ -3750,7 +3710,7 @@
                   <a:schemeClr val="bg1"/>
                 </a:solidFill>
               </a:rPr>
-              <a:t>2768</a:t>
+              <a:t>1979</a:t>
             </a:r>
           </a:p>
         </p:txBody>
@@ -3769,8 +3729,8 @@
         </p:nvSpPr>
         <p:spPr>
           <a:xfrm>
-            <a:off x="1422052" y="4086019"/>
-            <a:ext cx="538177" cy="419695"/>
+            <a:off x="1394930" y="3615553"/>
+            <a:ext cx="538177" cy="461665"/>
           </a:xfrm>
           <a:prstGeom prst="rect">
             <a:avLst/>
@@ -3789,7 +3749,7 @@
                   <a:schemeClr val="bg1"/>
                 </a:solidFill>
               </a:rPr>
-              <a:t>99</a:t>
+              <a:t>82</a:t>
             </a:r>
           </a:p>
         </p:txBody>
@@ -3810,8 +3770,8 @@
         </p:nvCxnSpPr>
         <p:spPr>
           <a:xfrm>
-            <a:off x="4109449" y="980082"/>
-            <a:ext cx="3311871" cy="0"/>
+            <a:off x="3738624" y="956932"/>
+            <a:ext cx="3485928" cy="0"/>
           </a:xfrm>
           <a:prstGeom prst="line">
             <a:avLst/>
@@ -3853,8 +3813,8 @@
         </p:nvCxnSpPr>
         <p:spPr>
           <a:xfrm>
-            <a:off x="5492873" y="2198957"/>
-            <a:ext cx="1510754" cy="0"/>
+            <a:off x="5649882" y="2245257"/>
+            <a:ext cx="1325271" cy="0"/>
           </a:xfrm>
           <a:prstGeom prst="line">
             <a:avLst/>
@@ -3895,7 +3855,7 @@
         <p:spPr>
           <a:xfrm>
             <a:off x="6864994" y="135388"/>
-            <a:ext cx="5184252" cy="6586418"/>
+            <a:ext cx="5184252" cy="5970865"/>
           </a:xfrm>
           <a:prstGeom prst="rect">
             <a:avLst/>
@@ -3928,7 +3888,7 @@
           <a:p>
             <a:r>
               <a:rPr lang="en-US" sz="2000" dirty="0"/>
-              <a:t>Disease-causing germline and somatic mutations, gain of function and loss of function</a:t>
+              <a:t>Disease-causing germline and somatic mutations, gain of function or loss of function</a:t>
             </a:r>
           </a:p>
           <a:p>
@@ -3989,19 +3949,19 @@
           <a:p>
             <a:r>
               <a:rPr lang="en-US" sz="2000" dirty="0"/>
-              <a:t>Variant is pathogenic for condition AND the gene to disease association is present in the gene to condition file provided by </a:t>
+              <a:t>Variant is pathogenic for </a:t>
+            </a:r>
+            <a:r>
+              <a:rPr lang="en-US" sz="2000"/>
+              <a:t>condition and </a:t>
+            </a:r>
+            <a:r>
+              <a:rPr lang="en-US" sz="2000" dirty="0"/>
+              <a:t>the gene to disease association is supported by OMIM or </a:t>
             </a:r>
             <a:r>
               <a:rPr lang="en-US" sz="2000" dirty="0" err="1"/>
-              <a:t>ClinVar</a:t>
-            </a:r>
-            <a:r>
-              <a:rPr lang="en-US" sz="2000" dirty="0"/>
-              <a:t>, which includes manual curation by NCBI staff and data from OMIM and </a:t>
-            </a:r>
-            <a:r>
-              <a:rPr lang="en-US" sz="2000" dirty="0" err="1"/>
-              <a:t>GeneReviews</a:t>
+              <a:t>Orphanet</a:t>
             </a:r>
             <a:endParaRPr lang="en-US" sz="2000" dirty="0"/>
           </a:p>

</xml_diff>